<commit_message>
bugfixes and active message count
</commit_message>
<xml_diff>
--- a/dotnetProj/נושאים במערכות מידע ושפות תכנות.pptx
+++ b/dotnetProj/נושאים במערכות מידע ושפות תכנות.pptx
@@ -4,12 +4,15 @@
   <p:sldMasterIdLst>
     <p:sldMasterId id="2147483648" r:id="rId1"/>
   </p:sldMasterIdLst>
+  <p:notesMasterIdLst>
+    <p:notesMasterId r:id="rId7"/>
+  </p:notesMasterIdLst>
   <p:sldIdLst>
     <p:sldId id="256" r:id="rId2"/>
     <p:sldId id="257" r:id="rId3"/>
     <p:sldId id="258" r:id="rId4"/>
-    <p:sldId id="259" r:id="rId5"/>
-    <p:sldId id="261" r:id="rId6"/>
+    <p:sldId id="261" r:id="rId5"/>
+    <p:sldId id="259" r:id="rId6"/>
   </p:sldIdLst>
   <p:sldSz cx="12192000" cy="6858000"/>
   <p:notesSz cx="6858000" cy="9144000"/>
@@ -108,7 +111,565 @@
       </a:defRPr>
     </a:lvl9pPr>
   </p:defaultTextStyle>
+  <p:extLst>
+    <p:ext uri="{EFAFB233-063F-42B5-8137-9DF3F51BA10A}">
+      <p15:sldGuideLst xmlns:p15="http://schemas.microsoft.com/office/powerpoint/2012/main"/>
+    </p:ext>
+  </p:extLst>
 </p:presentation>
+</file>
+
+<file path=ppt/notesMasters/notesMaster1.xml><?xml version="1.0" encoding="utf-8"?>
+<p:notesMaster xmlns:a="http://schemas.openxmlformats.org/drawingml/2006/main" xmlns:r="http://schemas.openxmlformats.org/officeDocument/2006/relationships" xmlns:p="http://schemas.openxmlformats.org/presentationml/2006/main">
+  <p:cSld>
+    <p:bg>
+      <p:bgRef idx="1001">
+        <a:schemeClr val="bg1"/>
+      </p:bgRef>
+    </p:bg>
+    <p:spTree>
+      <p:nvGrpSpPr>
+        <p:cNvPr id="1" name=""/>
+        <p:cNvGrpSpPr/>
+        <p:nvPr/>
+      </p:nvGrpSpPr>
+      <p:grpSpPr>
+        <a:xfrm>
+          <a:off x="0" y="0"/>
+          <a:ext cx="0" cy="0"/>
+          <a:chOff x="0" y="0"/>
+          <a:chExt cx="0" cy="0"/>
+        </a:xfrm>
+      </p:grpSpPr>
+      <p:sp>
+        <p:nvSpPr>
+          <p:cNvPr id="2" name="Header Placeholder 1"/>
+          <p:cNvSpPr>
+            <a:spLocks noGrp="1"/>
+          </p:cNvSpPr>
+          <p:nvPr>
+            <p:ph type="hdr" sz="quarter"/>
+          </p:nvPr>
+        </p:nvSpPr>
+        <p:spPr>
+          <a:xfrm>
+            <a:off x="0" y="0"/>
+            <a:ext cx="2971800" cy="458788"/>
+          </a:xfrm>
+          <a:prstGeom prst="rect">
+            <a:avLst/>
+          </a:prstGeom>
+        </p:spPr>
+        <p:txBody>
+          <a:bodyPr vert="horz" lIns="91440" tIns="45720" rIns="91440" bIns="45720" rtlCol="0"/>
+          <a:lstStyle>
+            <a:lvl1pPr algn="l">
+              <a:defRPr sz="1200"/>
+            </a:lvl1pPr>
+          </a:lstStyle>
+          <a:p>
+            <a:endParaRPr lang="en-US"/>
+          </a:p>
+        </p:txBody>
+      </p:sp>
+      <p:sp>
+        <p:nvSpPr>
+          <p:cNvPr id="3" name="Date Placeholder 2"/>
+          <p:cNvSpPr>
+            <a:spLocks noGrp="1"/>
+          </p:cNvSpPr>
+          <p:nvPr>
+            <p:ph type="dt" idx="1"/>
+          </p:nvPr>
+        </p:nvSpPr>
+        <p:spPr>
+          <a:xfrm>
+            <a:off x="3884613" y="0"/>
+            <a:ext cx="2971800" cy="458788"/>
+          </a:xfrm>
+          <a:prstGeom prst="rect">
+            <a:avLst/>
+          </a:prstGeom>
+        </p:spPr>
+        <p:txBody>
+          <a:bodyPr vert="horz" lIns="91440" tIns="45720" rIns="91440" bIns="45720" rtlCol="0"/>
+          <a:lstStyle>
+            <a:lvl1pPr algn="r">
+              <a:defRPr sz="1200"/>
+            </a:lvl1pPr>
+          </a:lstStyle>
+          <a:p>
+            <a:fld id="{EFE8C73E-F74C-4C55-B3B7-B7EB75BB4CBE}" type="datetimeFigureOut">
+              <a:rPr lang="en-US" smtClean="0"/>
+              <a:t>5/22/2022</a:t>
+            </a:fld>
+            <a:endParaRPr lang="en-US"/>
+          </a:p>
+        </p:txBody>
+      </p:sp>
+      <p:sp>
+        <p:nvSpPr>
+          <p:cNvPr id="4" name="Slide Image Placeholder 3"/>
+          <p:cNvSpPr>
+            <a:spLocks noGrp="1" noRot="1" noChangeAspect="1"/>
+          </p:cNvSpPr>
+          <p:nvPr>
+            <p:ph type="sldImg" idx="2"/>
+          </p:nvPr>
+        </p:nvSpPr>
+        <p:spPr>
+          <a:xfrm>
+            <a:off x="685800" y="1143000"/>
+            <a:ext cx="5486400" cy="3086100"/>
+          </a:xfrm>
+          <a:prstGeom prst="rect">
+            <a:avLst/>
+          </a:prstGeom>
+          <a:noFill/>
+          <a:ln w="12700">
+            <a:solidFill>
+              <a:prstClr val="black"/>
+            </a:solidFill>
+          </a:ln>
+        </p:spPr>
+        <p:txBody>
+          <a:bodyPr vert="horz" lIns="91440" tIns="45720" rIns="91440" bIns="45720" rtlCol="0" anchor="ctr"/>
+          <a:lstStyle/>
+          <a:p>
+            <a:endParaRPr lang="en-US"/>
+          </a:p>
+        </p:txBody>
+      </p:sp>
+      <p:sp>
+        <p:nvSpPr>
+          <p:cNvPr id="5" name="Notes Placeholder 4"/>
+          <p:cNvSpPr>
+            <a:spLocks noGrp="1"/>
+          </p:cNvSpPr>
+          <p:nvPr>
+            <p:ph type="body" sz="quarter" idx="3"/>
+          </p:nvPr>
+        </p:nvSpPr>
+        <p:spPr>
+          <a:xfrm>
+            <a:off x="685800" y="4400550"/>
+            <a:ext cx="5486400" cy="3600450"/>
+          </a:xfrm>
+          <a:prstGeom prst="rect">
+            <a:avLst/>
+          </a:prstGeom>
+        </p:spPr>
+        <p:txBody>
+          <a:bodyPr vert="horz" lIns="91440" tIns="45720" rIns="91440" bIns="45720" rtlCol="0"/>
+          <a:lstStyle/>
+          <a:p>
+            <a:pPr lvl="0"/>
+            <a:r>
+              <a:rPr lang="en-US"/>
+              <a:t>Click to edit Master text styles</a:t>
+            </a:r>
+          </a:p>
+          <a:p>
+            <a:pPr lvl="1"/>
+            <a:r>
+              <a:rPr lang="en-US"/>
+              <a:t>Second level</a:t>
+            </a:r>
+          </a:p>
+          <a:p>
+            <a:pPr lvl="2"/>
+            <a:r>
+              <a:rPr lang="en-US"/>
+              <a:t>Third level</a:t>
+            </a:r>
+          </a:p>
+          <a:p>
+            <a:pPr lvl="3"/>
+            <a:r>
+              <a:rPr lang="en-US"/>
+              <a:t>Fourth level</a:t>
+            </a:r>
+          </a:p>
+          <a:p>
+            <a:pPr lvl="4"/>
+            <a:r>
+              <a:rPr lang="en-US"/>
+              <a:t>Fifth level</a:t>
+            </a:r>
+          </a:p>
+        </p:txBody>
+      </p:sp>
+      <p:sp>
+        <p:nvSpPr>
+          <p:cNvPr id="6" name="Footer Placeholder 5"/>
+          <p:cNvSpPr>
+            <a:spLocks noGrp="1"/>
+          </p:cNvSpPr>
+          <p:nvPr>
+            <p:ph type="ftr" sz="quarter" idx="4"/>
+          </p:nvPr>
+        </p:nvSpPr>
+        <p:spPr>
+          <a:xfrm>
+            <a:off x="0" y="8685213"/>
+            <a:ext cx="2971800" cy="458787"/>
+          </a:xfrm>
+          <a:prstGeom prst="rect">
+            <a:avLst/>
+          </a:prstGeom>
+        </p:spPr>
+        <p:txBody>
+          <a:bodyPr vert="horz" lIns="91440" tIns="45720" rIns="91440" bIns="45720" rtlCol="0" anchor="b"/>
+          <a:lstStyle>
+            <a:lvl1pPr algn="l">
+              <a:defRPr sz="1200"/>
+            </a:lvl1pPr>
+          </a:lstStyle>
+          <a:p>
+            <a:endParaRPr lang="en-US"/>
+          </a:p>
+        </p:txBody>
+      </p:sp>
+      <p:sp>
+        <p:nvSpPr>
+          <p:cNvPr id="7" name="Slide Number Placeholder 6"/>
+          <p:cNvSpPr>
+            <a:spLocks noGrp="1"/>
+          </p:cNvSpPr>
+          <p:nvPr>
+            <p:ph type="sldNum" sz="quarter" idx="5"/>
+          </p:nvPr>
+        </p:nvSpPr>
+        <p:spPr>
+          <a:xfrm>
+            <a:off x="3884613" y="8685213"/>
+            <a:ext cx="2971800" cy="458787"/>
+          </a:xfrm>
+          <a:prstGeom prst="rect">
+            <a:avLst/>
+          </a:prstGeom>
+        </p:spPr>
+        <p:txBody>
+          <a:bodyPr vert="horz" lIns="91440" tIns="45720" rIns="91440" bIns="45720" rtlCol="0" anchor="b"/>
+          <a:lstStyle>
+            <a:lvl1pPr algn="r">
+              <a:defRPr sz="1200"/>
+            </a:lvl1pPr>
+          </a:lstStyle>
+          <a:p>
+            <a:fld id="{75915ED5-1498-40A4-A480-285EBEA4B1DE}" type="slidenum">
+              <a:rPr lang="en-US" smtClean="0"/>
+              <a:t>‹#›</a:t>
+            </a:fld>
+            <a:endParaRPr lang="en-US"/>
+          </a:p>
+        </p:txBody>
+      </p:sp>
+    </p:spTree>
+    <p:extLst>
+      <p:ext uri="{BB962C8B-B14F-4D97-AF65-F5344CB8AC3E}">
+        <p14:creationId xmlns:p14="http://schemas.microsoft.com/office/powerpoint/2010/main" val="1593904743"/>
+      </p:ext>
+    </p:extLst>
+  </p:cSld>
+  <p:clrMap bg1="lt1" tx1="dk1" bg2="lt2" tx2="dk2" accent1="accent1" accent2="accent2" accent3="accent3" accent4="accent4" accent5="accent5" accent6="accent6" hlink="hlink" folHlink="folHlink"/>
+  <p:notesStyle>
+    <a:lvl1pPr marL="0" algn="l" defTabSz="914400" rtl="0" eaLnBrk="1" latinLnBrk="0" hangingPunct="1">
+      <a:defRPr sz="1200" kern="1200">
+        <a:solidFill>
+          <a:schemeClr val="tx1"/>
+        </a:solidFill>
+        <a:latin typeface="+mn-lt"/>
+        <a:ea typeface="+mn-ea"/>
+        <a:cs typeface="+mn-cs"/>
+      </a:defRPr>
+    </a:lvl1pPr>
+    <a:lvl2pPr marL="457200" algn="l" defTabSz="914400" rtl="0" eaLnBrk="1" latinLnBrk="0" hangingPunct="1">
+      <a:defRPr sz="1200" kern="1200">
+        <a:solidFill>
+          <a:schemeClr val="tx1"/>
+        </a:solidFill>
+        <a:latin typeface="+mn-lt"/>
+        <a:ea typeface="+mn-ea"/>
+        <a:cs typeface="+mn-cs"/>
+      </a:defRPr>
+    </a:lvl2pPr>
+    <a:lvl3pPr marL="914400" algn="l" defTabSz="914400" rtl="0" eaLnBrk="1" latinLnBrk="0" hangingPunct="1">
+      <a:defRPr sz="1200" kern="1200">
+        <a:solidFill>
+          <a:schemeClr val="tx1"/>
+        </a:solidFill>
+        <a:latin typeface="+mn-lt"/>
+        <a:ea typeface="+mn-ea"/>
+        <a:cs typeface="+mn-cs"/>
+      </a:defRPr>
+    </a:lvl3pPr>
+    <a:lvl4pPr marL="1371600" algn="l" defTabSz="914400" rtl="0" eaLnBrk="1" latinLnBrk="0" hangingPunct="1">
+      <a:defRPr sz="1200" kern="1200">
+        <a:solidFill>
+          <a:schemeClr val="tx1"/>
+        </a:solidFill>
+        <a:latin typeface="+mn-lt"/>
+        <a:ea typeface="+mn-ea"/>
+        <a:cs typeface="+mn-cs"/>
+      </a:defRPr>
+    </a:lvl4pPr>
+    <a:lvl5pPr marL="1828800" algn="l" defTabSz="914400" rtl="0" eaLnBrk="1" latinLnBrk="0" hangingPunct="1">
+      <a:defRPr sz="1200" kern="1200">
+        <a:solidFill>
+          <a:schemeClr val="tx1"/>
+        </a:solidFill>
+        <a:latin typeface="+mn-lt"/>
+        <a:ea typeface="+mn-ea"/>
+        <a:cs typeface="+mn-cs"/>
+      </a:defRPr>
+    </a:lvl5pPr>
+    <a:lvl6pPr marL="2286000" algn="l" defTabSz="914400" rtl="0" eaLnBrk="1" latinLnBrk="0" hangingPunct="1">
+      <a:defRPr sz="1200" kern="1200">
+        <a:solidFill>
+          <a:schemeClr val="tx1"/>
+        </a:solidFill>
+        <a:latin typeface="+mn-lt"/>
+        <a:ea typeface="+mn-ea"/>
+        <a:cs typeface="+mn-cs"/>
+      </a:defRPr>
+    </a:lvl6pPr>
+    <a:lvl7pPr marL="2743200" algn="l" defTabSz="914400" rtl="0" eaLnBrk="1" latinLnBrk="0" hangingPunct="1">
+      <a:defRPr sz="1200" kern="1200">
+        <a:solidFill>
+          <a:schemeClr val="tx1"/>
+        </a:solidFill>
+        <a:latin typeface="+mn-lt"/>
+        <a:ea typeface="+mn-ea"/>
+        <a:cs typeface="+mn-cs"/>
+      </a:defRPr>
+    </a:lvl7pPr>
+    <a:lvl8pPr marL="3200400" algn="l" defTabSz="914400" rtl="0" eaLnBrk="1" latinLnBrk="0" hangingPunct="1">
+      <a:defRPr sz="1200" kern="1200">
+        <a:solidFill>
+          <a:schemeClr val="tx1"/>
+        </a:solidFill>
+        <a:latin typeface="+mn-lt"/>
+        <a:ea typeface="+mn-ea"/>
+        <a:cs typeface="+mn-cs"/>
+      </a:defRPr>
+    </a:lvl8pPr>
+    <a:lvl9pPr marL="3657600" algn="l" defTabSz="914400" rtl="0" eaLnBrk="1" latinLnBrk="0" hangingPunct="1">
+      <a:defRPr sz="1200" kern="1200">
+        <a:solidFill>
+          <a:schemeClr val="tx1"/>
+        </a:solidFill>
+        <a:latin typeface="+mn-lt"/>
+        <a:ea typeface="+mn-ea"/>
+        <a:cs typeface="+mn-cs"/>
+      </a:defRPr>
+    </a:lvl9pPr>
+  </p:notesStyle>
+</p:notesMaster>
+</file>
+
+<file path=ppt/notesSlides/notesSlide1.xml><?xml version="1.0" encoding="utf-8"?>
+<p:notes xmlns:a="http://schemas.openxmlformats.org/drawingml/2006/main" xmlns:r="http://schemas.openxmlformats.org/officeDocument/2006/relationships" xmlns:p="http://schemas.openxmlformats.org/presentationml/2006/main">
+  <p:cSld>
+    <p:spTree>
+      <p:nvGrpSpPr>
+        <p:cNvPr id="1" name=""/>
+        <p:cNvGrpSpPr/>
+        <p:nvPr/>
+      </p:nvGrpSpPr>
+      <p:grpSpPr>
+        <a:xfrm>
+          <a:off x="0" y="0"/>
+          <a:ext cx="0" cy="0"/>
+          <a:chOff x="0" y="0"/>
+          <a:chExt cx="0" cy="0"/>
+        </a:xfrm>
+      </p:grpSpPr>
+      <p:sp>
+        <p:nvSpPr>
+          <p:cNvPr id="2" name="Slide Image Placeholder 1"/>
+          <p:cNvSpPr>
+            <a:spLocks noGrp="1" noRot="1" noChangeAspect="1"/>
+          </p:cNvSpPr>
+          <p:nvPr>
+            <p:ph type="sldImg"/>
+          </p:nvPr>
+        </p:nvSpPr>
+        <p:spPr/>
+      </p:sp>
+      <p:sp>
+        <p:nvSpPr>
+          <p:cNvPr id="3" name="Notes Placeholder 2"/>
+          <p:cNvSpPr>
+            <a:spLocks noGrp="1"/>
+          </p:cNvSpPr>
+          <p:nvPr>
+            <p:ph type="body" idx="1"/>
+          </p:nvPr>
+        </p:nvSpPr>
+        <p:spPr/>
+        <p:txBody>
+          <a:bodyPr/>
+          <a:lstStyle/>
+          <a:p>
+            <a:endParaRPr lang="en-US" dirty="0"/>
+          </a:p>
+        </p:txBody>
+      </p:sp>
+      <p:sp>
+        <p:nvSpPr>
+          <p:cNvPr id="4" name="Slide Number Placeholder 3"/>
+          <p:cNvSpPr>
+            <a:spLocks noGrp="1"/>
+          </p:cNvSpPr>
+          <p:nvPr>
+            <p:ph type="sldNum" sz="quarter" idx="5"/>
+          </p:nvPr>
+        </p:nvSpPr>
+        <p:spPr/>
+        <p:txBody>
+          <a:bodyPr/>
+          <a:lstStyle/>
+          <a:p>
+            <a:fld id="{75915ED5-1498-40A4-A480-285EBEA4B1DE}" type="slidenum">
+              <a:rPr lang="en-US" smtClean="0"/>
+              <a:t>2</a:t>
+            </a:fld>
+            <a:endParaRPr lang="en-US"/>
+          </a:p>
+        </p:txBody>
+      </p:sp>
+    </p:spTree>
+    <p:extLst>
+      <p:ext uri="{BB962C8B-B14F-4D97-AF65-F5344CB8AC3E}">
+        <p14:creationId xmlns:p14="http://schemas.microsoft.com/office/powerpoint/2010/main" val="1651543909"/>
+      </p:ext>
+    </p:extLst>
+  </p:cSld>
+  <p:clrMapOvr>
+    <a:masterClrMapping/>
+  </p:clrMapOvr>
+</p:notes>
+</file>
+
+<file path=ppt/notesSlides/notesSlide2.xml><?xml version="1.0" encoding="utf-8"?>
+<p:notes xmlns:a="http://schemas.openxmlformats.org/drawingml/2006/main" xmlns:r="http://schemas.openxmlformats.org/officeDocument/2006/relationships" xmlns:p="http://schemas.openxmlformats.org/presentationml/2006/main">
+  <p:cSld>
+    <p:spTree>
+      <p:nvGrpSpPr>
+        <p:cNvPr id="1" name=""/>
+        <p:cNvGrpSpPr/>
+        <p:nvPr/>
+      </p:nvGrpSpPr>
+      <p:grpSpPr>
+        <a:xfrm>
+          <a:off x="0" y="0"/>
+          <a:ext cx="0" cy="0"/>
+          <a:chOff x="0" y="0"/>
+          <a:chExt cx="0" cy="0"/>
+        </a:xfrm>
+      </p:grpSpPr>
+      <p:sp>
+        <p:nvSpPr>
+          <p:cNvPr id="2" name="Slide Image Placeholder 1"/>
+          <p:cNvSpPr>
+            <a:spLocks noGrp="1" noRot="1" noChangeAspect="1"/>
+          </p:cNvSpPr>
+          <p:nvPr>
+            <p:ph type="sldImg"/>
+          </p:nvPr>
+        </p:nvSpPr>
+        <p:spPr/>
+      </p:sp>
+      <p:sp>
+        <p:nvSpPr>
+          <p:cNvPr id="3" name="Notes Placeholder 2"/>
+          <p:cNvSpPr>
+            <a:spLocks noGrp="1"/>
+          </p:cNvSpPr>
+          <p:nvPr>
+            <p:ph type="body" idx="1"/>
+          </p:nvPr>
+        </p:nvSpPr>
+        <p:spPr/>
+        <p:txBody>
+          <a:bodyPr/>
+          <a:lstStyle/>
+          <a:p>
+            <a:r>
+              <a:rPr lang="en-US" dirty="0"/>
+              <a:t>Our system contains 2 main components – models and controllers. Each class in models represents a table in our database, and each controller contains the relevant actions for the different requests that are related to the corresponding model. The access to the DB is using the “context” model which holds the current stored data. </a:t>
+            </a:r>
+          </a:p>
+          <a:p>
+            <a:r>
+              <a:rPr lang="en-US" dirty="0"/>
+              <a:t>After defining the models, the framework generates a skeleton for the corresponding controller with basic functions implementations, such as “post”, “get”, “delete”. </a:t>
+            </a:r>
+          </a:p>
+          <a:p>
+            <a:r>
+              <a:rPr lang="en-US" dirty="0"/>
+              <a:t>We needed to change the generated functions in the controllers to fit the API’s requirements (add headers, check email address in “post” requests, update relevant data in database when deleting task/people).</a:t>
+            </a:r>
+          </a:p>
+          <a:p>
+            <a:r>
+              <a:rPr lang="en-US" dirty="0"/>
+              <a:t>We added the more “complex” functions, such as “</a:t>
+            </a:r>
+            <a:r>
+              <a:rPr lang="en-US" dirty="0" err="1"/>
+              <a:t>api</a:t>
+            </a:r>
+            <a:r>
+              <a:rPr lang="en-US" dirty="0"/>
+              <a:t>/people/{id}/tasks” which requires getting data from both of the tables we used.</a:t>
+            </a:r>
+          </a:p>
+          <a:p>
+            <a:pPr algn="l" rtl="0"/>
+            <a:endParaRPr lang="en-US"/>
+          </a:p>
+          <a:p>
+            <a:endParaRPr lang="en-US" dirty="0"/>
+          </a:p>
+        </p:txBody>
+      </p:sp>
+      <p:sp>
+        <p:nvSpPr>
+          <p:cNvPr id="4" name="Slide Number Placeholder 3"/>
+          <p:cNvSpPr>
+            <a:spLocks noGrp="1"/>
+          </p:cNvSpPr>
+          <p:nvPr>
+            <p:ph type="sldNum" sz="quarter" idx="5"/>
+          </p:nvPr>
+        </p:nvSpPr>
+        <p:spPr/>
+        <p:txBody>
+          <a:bodyPr/>
+          <a:lstStyle/>
+          <a:p>
+            <a:fld id="{75915ED5-1498-40A4-A480-285EBEA4B1DE}" type="slidenum">
+              <a:rPr lang="en-US" smtClean="0"/>
+              <a:t>5</a:t>
+            </a:fld>
+            <a:endParaRPr lang="en-US"/>
+          </a:p>
+        </p:txBody>
+      </p:sp>
+    </p:spTree>
+    <p:extLst>
+      <p:ext uri="{BB962C8B-B14F-4D97-AF65-F5344CB8AC3E}">
+        <p14:creationId xmlns:p14="http://schemas.microsoft.com/office/powerpoint/2010/main" val="1604122797"/>
+      </p:ext>
+    </p:extLst>
+  </p:cSld>
+  <p:clrMapOvr>
+    <a:masterClrMapping/>
+  </p:clrMapOvr>
+</p:notes>
 </file>
 
 <file path=ppt/slideLayouts/slideLayout1.xml><?xml version="1.0" encoding="utf-8"?>
@@ -250,7 +811,7 @@
           <a:p>
             <a:fld id="{48A87A34-81AB-432B-8DAE-1953F412C126}" type="datetimeFigureOut">
               <a:rPr lang="en-US" dirty="0"/>
-              <a:t>4/2/2022</a:t>
+              <a:t>5/22/2022</a:t>
             </a:fld>
             <a:endParaRPr lang="en-US" dirty="0"/>
           </a:p>
@@ -456,7 +1017,7 @@
           <a:p>
             <a:fld id="{48A87A34-81AB-432B-8DAE-1953F412C126}" type="datetimeFigureOut">
               <a:rPr lang="en-US" dirty="0"/>
-              <a:t>4/2/2022</a:t>
+              <a:t>5/22/2022</a:t>
             </a:fld>
             <a:endParaRPr lang="en-US" dirty="0"/>
           </a:p>
@@ -666,7 +1227,7 @@
           <a:p>
             <a:fld id="{48A87A34-81AB-432B-8DAE-1953F412C126}" type="datetimeFigureOut">
               <a:rPr lang="en-US" dirty="0"/>
-              <a:t>4/2/2022</a:t>
+              <a:t>5/22/2022</a:t>
             </a:fld>
             <a:endParaRPr lang="en-US" dirty="0"/>
           </a:p>
@@ -862,7 +1423,7 @@
           <a:p>
             <a:fld id="{48A87A34-81AB-432B-8DAE-1953F412C126}" type="datetimeFigureOut">
               <a:rPr lang="en-US" dirty="0"/>
-              <a:t>4/2/2022</a:t>
+              <a:t>5/22/2022</a:t>
             </a:fld>
             <a:endParaRPr lang="en-US" dirty="0"/>
           </a:p>
@@ -1136,7 +1697,7 @@
           <a:p>
             <a:fld id="{48A87A34-81AB-432B-8DAE-1953F412C126}" type="datetimeFigureOut">
               <a:rPr lang="en-US" dirty="0"/>
-              <a:t>4/2/2022</a:t>
+              <a:t>5/22/2022</a:t>
             </a:fld>
             <a:endParaRPr lang="en-US" dirty="0"/>
           </a:p>
@@ -1399,7 +1960,7 @@
           <a:p>
             <a:fld id="{48A87A34-81AB-432B-8DAE-1953F412C126}" type="datetimeFigureOut">
               <a:rPr lang="en-US" dirty="0"/>
-              <a:t>4/2/2022</a:t>
+              <a:t>5/22/2022</a:t>
             </a:fld>
             <a:endParaRPr lang="en-US" dirty="0"/>
           </a:p>
@@ -1810,7 +2371,7 @@
           <a:p>
             <a:fld id="{48A87A34-81AB-432B-8DAE-1953F412C126}" type="datetimeFigureOut">
               <a:rPr lang="en-US" dirty="0"/>
-              <a:t>4/2/2022</a:t>
+              <a:t>5/22/2022</a:t>
             </a:fld>
             <a:endParaRPr lang="en-US" dirty="0"/>
           </a:p>
@@ -1954,7 +2515,7 @@
           <a:p>
             <a:fld id="{48A87A34-81AB-432B-8DAE-1953F412C126}" type="datetimeFigureOut">
               <a:rPr lang="en-US" dirty="0"/>
-              <a:t>4/2/2022</a:t>
+              <a:t>5/22/2022</a:t>
             </a:fld>
             <a:endParaRPr lang="en-US" dirty="0"/>
           </a:p>
@@ -2075,7 +2636,7 @@
           <a:p>
             <a:fld id="{48A87A34-81AB-432B-8DAE-1953F412C126}" type="datetimeFigureOut">
               <a:rPr lang="en-US" dirty="0"/>
-              <a:t>4/2/2022</a:t>
+              <a:t>5/22/2022</a:t>
             </a:fld>
             <a:endParaRPr lang="en-US" dirty="0"/>
           </a:p>
@@ -2321,7 +2882,7 @@
           <a:p>
             <a:fld id="{48A87A34-81AB-432B-8DAE-1953F412C126}" type="datetimeFigureOut">
               <a:rPr lang="en-US" dirty="0"/>
-              <a:t>4/2/2022</a:t>
+              <a:t>5/22/2022</a:t>
             </a:fld>
             <a:endParaRPr lang="en-US" dirty="0"/>
           </a:p>
@@ -2762,7 +3323,7 @@
             <a:fld id="{48A87A34-81AB-432B-8DAE-1953F412C126}" type="datetimeFigureOut">
               <a:rPr lang="en-US" dirty="0"/>
               <a:pPr/>
-              <a:t>4/2/2022</a:t>
+              <a:t>5/22/2022</a:t>
             </a:fld>
             <a:endParaRPr lang="en-US" dirty="0"/>
           </a:p>
@@ -3085,7 +3646,7 @@
             <a:fld id="{48A87A34-81AB-432B-8DAE-1953F412C126}" type="datetimeFigureOut">
               <a:rPr lang="en-US" dirty="0"/>
               <a:pPr/>
-              <a:t>4/2/2022</a:t>
+              <a:t>5/22/2022</a:t>
             </a:fld>
             <a:endParaRPr lang="en-US" dirty="0"/>
           </a:p>
@@ -3768,41 +4329,19 @@
         </p:spPr>
         <p:txBody>
           <a:bodyPr>
-            <a:normAutofit fontScale="92500" lnSpcReduction="20000"/>
+            <a:normAutofit/>
           </a:bodyPr>
           <a:lstStyle/>
           <a:p>
-            <a:pPr marL="0" indent="0" algn="l" rtl="0">
-              <a:buNone/>
-            </a:pPr>
             <a:r>
               <a:rPr lang="en-US" dirty="0"/>
-              <a:t>C# is a modern multi-paradigm programming language – it is object oriented, functional, procedural etc.</a:t>
-            </a:r>
-          </a:p>
-          <a:p>
-            <a:pPr algn="l" rtl="0"/>
+              <a:t>C# is a modern multi-paradigm programming language – it can be object oriented, functional, procedural etc.</a:t>
+            </a:r>
+          </a:p>
+          <a:p>
             <a:r>
               <a:rPr lang="en-US" dirty="0"/>
-              <a:t>C# has static type system (strongly typed).</a:t>
-            </a:r>
-          </a:p>
-          <a:p>
-            <a:pPr algn="l" rtl="0"/>
-            <a:r>
-              <a:rPr lang="en-US" dirty="0"/>
-              <a:t>C# uses garbage – collector (like Java).</a:t>
-            </a:r>
-          </a:p>
-          <a:p>
-            <a:pPr algn="l" rtl="0"/>
-            <a:r>
-              <a:rPr lang="en-US" dirty="0"/>
-              <a:t>C# is </a:t>
-            </a:r>
-            <a:r>
-              <a:rPr lang="en-US" dirty="0" err="1"/>
-              <a:t>aType</a:t>
+              <a:t>Type</a:t>
             </a:r>
             <a:r>
               <a:rPr lang="he-IL" dirty="0"/>
@@ -3810,19 +4349,17 @@
             </a:r>
             <a:r>
               <a:rPr lang="en-US" dirty="0"/>
-              <a:t>safe language</a:t>
-            </a:r>
-            <a:endParaRPr lang="he-IL" dirty="0"/>
-          </a:p>
-          <a:p>
-            <a:pPr algn="l" rtl="0"/>
-            <a:r>
+              <a:t>safe language with static types, including auto memory-management. </a:t>
+            </a:r>
+            <a:br>
               <a:rPr lang="en-US" dirty="0"/>
-              <a:t>The Syntax of C# resembles C++, Java.</a:t>
-            </a:r>
-          </a:p>
-          <a:p>
-            <a:pPr algn="l" rtl="0"/>
+            </a:br>
+            <a:r>
+              <a:rPr lang="en-US" dirty="0"/>
+              <a:t>In addition, it’s syntax resembles C++ and Java</a:t>
+            </a:r>
+          </a:p>
+          <a:p>
             <a:r>
               <a:rPr lang="en-US" dirty="0"/>
               <a:t>C# was designed by Microsoft in 2000, and according to </a:t>
@@ -3863,7 +4400,7 @@
           <p:nvPr/>
         </p:nvPicPr>
         <p:blipFill>
-          <a:blip r:embed="rId2">
+          <a:blip r:embed="rId3">
             <a:extLst>
               <a:ext uri="{28A0092B-C50C-407E-A947-70E740481C1C}">
                 <a14:useLocalDpi xmlns:a14="http://schemas.microsoft.com/office/drawing/2010/main" val="0"/>
@@ -3939,7 +4476,7 @@
         <p:spPr/>
         <p:txBody>
           <a:bodyPr>
-            <a:normAutofit fontScale="92500" lnSpcReduction="10000"/>
+            <a:normAutofit/>
           </a:bodyPr>
           <a:lstStyle/>
           <a:p>
@@ -3948,7 +4485,7 @@
             </a:pPr>
             <a:r>
               <a:rPr lang="en-US" dirty="0"/>
-              <a:t>.NET framework is the most popular web-framework for C# which was also designed by Microsoft (was released in 2002).</a:t>
+              <a:t>.NET framework is the most popular web-framework for C#, designed by Microsoft.</a:t>
             </a:r>
           </a:p>
           <a:p>
@@ -3960,13 +4497,13 @@
           <a:p>
             <a:r>
               <a:rPr lang="en-US" dirty="0"/>
-              <a:t>.NET is open source, and it has the support of thousands developers and companies who contributes to the platform. (.NET community has over 5,000,000 developers who support each other)</a:t>
+              <a:t>.NET is open source, and it’s community has over 5,000,000 developers which support and contribute to it.</a:t>
             </a:r>
           </a:p>
           <a:p>
             <a:r>
               <a:rPr lang="en-US" dirty="0"/>
-              <a:t>.NET is a vey fast framework. It provides better response time and require less compute power than most of other solutions.</a:t>
+              <a:t>.NET is a very fast framework. It provides better response time and require less compute power than most of other solutions.</a:t>
             </a:r>
           </a:p>
           <a:p>
@@ -4380,411 +4917,6 @@
         <p:spPr/>
         <p:txBody>
           <a:bodyPr>
-            <a:normAutofit fontScale="85000" lnSpcReduction="20000"/>
-          </a:bodyPr>
-          <a:lstStyle/>
-          <a:p>
-            <a:r>
-              <a:rPr lang="en-US" dirty="0"/>
-              <a:t>Our system contains 2 main components – models and controllers. Each class in models represents a table in our database, and each controller contains the relevant actions for the different requests that are related to the corresponding model. The access to the DB is using the “context” model which holds the current stored data. </a:t>
-            </a:r>
-          </a:p>
-          <a:p>
-            <a:r>
-              <a:rPr lang="en-US" dirty="0"/>
-              <a:t>After defining the models, the framework generates a skeleton for the corresponding controller with basic functions implementations, such as “post”, “get”, “delete”. </a:t>
-            </a:r>
-          </a:p>
-          <a:p>
-            <a:r>
-              <a:rPr lang="en-US" dirty="0"/>
-              <a:t>We needed to change the generated functions in the controllers to fit the API’s requirements (add headers, check email uniqueness in “post” requests, update relevant data in database when deleting task/people).</a:t>
-            </a:r>
-          </a:p>
-          <a:p>
-            <a:r>
-              <a:rPr lang="en-US" dirty="0"/>
-              <a:t>We added the more “complex” functions, such as “</a:t>
-            </a:r>
-            <a:r>
-              <a:rPr lang="en-US" dirty="0" err="1"/>
-              <a:t>api</a:t>
-            </a:r>
-            <a:r>
-              <a:rPr lang="en-US" dirty="0"/>
-              <a:t>/people/{id}/tasks” which requires getting data from both of the tables we used.</a:t>
-            </a:r>
-          </a:p>
-          <a:p>
-            <a:pPr algn="l" rtl="0"/>
-            <a:endParaRPr lang="en-US" dirty="0"/>
-          </a:p>
-        </p:txBody>
-      </p:sp>
-      <p:pic>
-        <p:nvPicPr>
-          <p:cNvPr id="5" name="תמונה 4">
-            <a:extLst>
-              <a:ext uri="{FF2B5EF4-FFF2-40B4-BE49-F238E27FC236}">
-                <a16:creationId xmlns:a16="http://schemas.microsoft.com/office/drawing/2014/main" id="{CF0F19D2-9138-4ADD-A468-3E8134473D2E}"/>
-              </a:ext>
-            </a:extLst>
-          </p:cNvPr>
-          <p:cNvPicPr>
-            <a:picLocks noChangeAspect="1"/>
-          </p:cNvPicPr>
-          <p:nvPr/>
-        </p:nvPicPr>
-        <p:blipFill rotWithShape="1">
-          <a:blip r:embed="rId2">
-            <a:extLst>
-              <a:ext uri="{28A0092B-C50C-407E-A947-70E740481C1C}">
-                <a14:useLocalDpi xmlns:a14="http://schemas.microsoft.com/office/drawing/2010/main" val="0"/>
-              </a:ext>
-            </a:extLst>
-          </a:blip>
-          <a:srcRect l="9519" t="11531" r="11495"/>
-          <a:stretch/>
-        </p:blipFill>
-        <p:spPr>
-          <a:xfrm>
-            <a:off x="4434459" y="90541"/>
-            <a:ext cx="3323082" cy="1658878"/>
-          </a:xfrm>
-          <a:prstGeom prst="rect">
-            <a:avLst/>
-          </a:prstGeom>
-          <a:ln>
-            <a:noFill/>
-          </a:ln>
-          <a:effectLst>
-            <a:softEdge rad="112500"/>
-          </a:effectLst>
-        </p:spPr>
-      </p:pic>
-    </p:spTree>
-    <p:extLst>
-      <p:ext uri="{BB962C8B-B14F-4D97-AF65-F5344CB8AC3E}">
-        <p14:creationId xmlns:p14="http://schemas.microsoft.com/office/powerpoint/2010/main" val="700676066"/>
-      </p:ext>
-    </p:extLst>
-  </p:cSld>
-  <p:clrMapOvr>
-    <a:masterClrMapping/>
-  </p:clrMapOvr>
-  <p:timing>
-    <p:tnLst>
-      <p:par>
-        <p:cTn id="1" dur="indefinite" restart="never" nodeType="tmRoot">
-          <p:childTnLst>
-            <p:seq concurrent="1" nextAc="seek">
-              <p:cTn id="2" dur="indefinite" nodeType="mainSeq">
-                <p:childTnLst>
-                  <p:par>
-                    <p:cTn id="3" fill="hold">
-                      <p:stCondLst>
-                        <p:cond delay="indefinite"/>
-                      </p:stCondLst>
-                      <p:childTnLst>
-                        <p:par>
-                          <p:cTn id="4" fill="hold">
-                            <p:stCondLst>
-                              <p:cond delay="0"/>
-                            </p:stCondLst>
-                            <p:childTnLst>
-                              <p:par>
-                                <p:cTn id="5" presetID="22" presetClass="entr" presetSubtype="4" fill="hold" nodeType="clickEffect">
-                                  <p:stCondLst>
-                                    <p:cond delay="0"/>
-                                  </p:stCondLst>
-                                  <p:childTnLst>
-                                    <p:set>
-                                      <p:cBhvr>
-                                        <p:cTn id="6" dur="1" fill="hold">
-                                          <p:stCondLst>
-                                            <p:cond delay="0"/>
-                                          </p:stCondLst>
-                                        </p:cTn>
-                                        <p:tgtEl>
-                                          <p:spTgt spid="3">
-                                            <p:txEl>
-                                              <p:pRg st="1" end="1"/>
-                                            </p:txEl>
-                                          </p:spTgt>
-                                        </p:tgtEl>
-                                        <p:attrNameLst>
-                                          <p:attrName>style.visibility</p:attrName>
-                                        </p:attrNameLst>
-                                      </p:cBhvr>
-                                      <p:to>
-                                        <p:strVal val="visible"/>
-                                      </p:to>
-                                    </p:set>
-                                    <p:animEffect transition="in" filter="wipe(down)">
-                                      <p:cBhvr>
-                                        <p:cTn id="7" dur="500"/>
-                                        <p:tgtEl>
-                                          <p:spTgt spid="3">
-                                            <p:txEl>
-                                              <p:pRg st="1" end="1"/>
-                                            </p:txEl>
-                                          </p:spTgt>
-                                        </p:tgtEl>
-                                      </p:cBhvr>
-                                    </p:animEffect>
-                                  </p:childTnLst>
-                                </p:cTn>
-                              </p:par>
-                            </p:childTnLst>
-                          </p:cTn>
-                        </p:par>
-                      </p:childTnLst>
-                    </p:cTn>
-                  </p:par>
-                  <p:par>
-                    <p:cTn id="8" fill="hold">
-                      <p:stCondLst>
-                        <p:cond delay="indefinite"/>
-                      </p:stCondLst>
-                      <p:childTnLst>
-                        <p:par>
-                          <p:cTn id="9" fill="hold">
-                            <p:stCondLst>
-                              <p:cond delay="0"/>
-                            </p:stCondLst>
-                            <p:childTnLst>
-                              <p:par>
-                                <p:cTn id="10" presetID="22" presetClass="entr" presetSubtype="4" fill="hold" nodeType="clickEffect">
-                                  <p:stCondLst>
-                                    <p:cond delay="0"/>
-                                  </p:stCondLst>
-                                  <p:childTnLst>
-                                    <p:set>
-                                      <p:cBhvr>
-                                        <p:cTn id="11" dur="1" fill="hold">
-                                          <p:stCondLst>
-                                            <p:cond delay="0"/>
-                                          </p:stCondLst>
-                                        </p:cTn>
-                                        <p:tgtEl>
-                                          <p:spTgt spid="3">
-                                            <p:txEl>
-                                              <p:pRg st="2" end="2"/>
-                                            </p:txEl>
-                                          </p:spTgt>
-                                        </p:tgtEl>
-                                        <p:attrNameLst>
-                                          <p:attrName>style.visibility</p:attrName>
-                                        </p:attrNameLst>
-                                      </p:cBhvr>
-                                      <p:to>
-                                        <p:strVal val="visible"/>
-                                      </p:to>
-                                    </p:set>
-                                    <p:animEffect transition="in" filter="wipe(down)">
-                                      <p:cBhvr>
-                                        <p:cTn id="12" dur="500"/>
-                                        <p:tgtEl>
-                                          <p:spTgt spid="3">
-                                            <p:txEl>
-                                              <p:pRg st="2" end="2"/>
-                                            </p:txEl>
-                                          </p:spTgt>
-                                        </p:tgtEl>
-                                      </p:cBhvr>
-                                    </p:animEffect>
-                                  </p:childTnLst>
-                                </p:cTn>
-                              </p:par>
-                            </p:childTnLst>
-                          </p:cTn>
-                        </p:par>
-                      </p:childTnLst>
-                    </p:cTn>
-                  </p:par>
-                  <p:par>
-                    <p:cTn id="13" fill="hold">
-                      <p:stCondLst>
-                        <p:cond delay="indefinite"/>
-                      </p:stCondLst>
-                      <p:childTnLst>
-                        <p:par>
-                          <p:cTn id="14" fill="hold">
-                            <p:stCondLst>
-                              <p:cond delay="0"/>
-                            </p:stCondLst>
-                            <p:childTnLst>
-                              <p:par>
-                                <p:cTn id="15" presetID="22" presetClass="entr" presetSubtype="4" fill="hold" nodeType="clickEffect">
-                                  <p:stCondLst>
-                                    <p:cond delay="0"/>
-                                  </p:stCondLst>
-                                  <p:childTnLst>
-                                    <p:set>
-                                      <p:cBhvr>
-                                        <p:cTn id="16" dur="1" fill="hold">
-                                          <p:stCondLst>
-                                            <p:cond delay="0"/>
-                                          </p:stCondLst>
-                                        </p:cTn>
-                                        <p:tgtEl>
-                                          <p:spTgt spid="3">
-                                            <p:txEl>
-                                              <p:pRg st="3" end="3"/>
-                                            </p:txEl>
-                                          </p:spTgt>
-                                        </p:tgtEl>
-                                        <p:attrNameLst>
-                                          <p:attrName>style.visibility</p:attrName>
-                                        </p:attrNameLst>
-                                      </p:cBhvr>
-                                      <p:to>
-                                        <p:strVal val="visible"/>
-                                      </p:to>
-                                    </p:set>
-                                    <p:animEffect transition="in" filter="wipe(down)">
-                                      <p:cBhvr>
-                                        <p:cTn id="17" dur="500"/>
-                                        <p:tgtEl>
-                                          <p:spTgt spid="3">
-                                            <p:txEl>
-                                              <p:pRg st="3" end="3"/>
-                                            </p:txEl>
-                                          </p:spTgt>
-                                        </p:tgtEl>
-                                      </p:cBhvr>
-                                    </p:animEffect>
-                                  </p:childTnLst>
-                                </p:cTn>
-                              </p:par>
-                            </p:childTnLst>
-                          </p:cTn>
-                        </p:par>
-                      </p:childTnLst>
-                    </p:cTn>
-                  </p:par>
-                  <p:par>
-                    <p:cTn id="18" fill="hold">
-                      <p:stCondLst>
-                        <p:cond delay="indefinite"/>
-                      </p:stCondLst>
-                      <p:childTnLst>
-                        <p:par>
-                          <p:cTn id="19" fill="hold">
-                            <p:stCondLst>
-                              <p:cond delay="0"/>
-                            </p:stCondLst>
-                            <p:childTnLst>
-                              <p:par>
-                                <p:cTn id="20" presetID="22" presetClass="entr" presetSubtype="4" fill="hold" nodeType="clickEffect">
-                                  <p:stCondLst>
-                                    <p:cond delay="0"/>
-                                  </p:stCondLst>
-                                  <p:childTnLst>
-                                    <p:set>
-                                      <p:cBhvr>
-                                        <p:cTn id="21" dur="1" fill="hold">
-                                          <p:stCondLst>
-                                            <p:cond delay="0"/>
-                                          </p:stCondLst>
-                                        </p:cTn>
-                                        <p:tgtEl>
-                                          <p:spTgt spid="3">
-                                            <p:txEl>
-                                              <p:pRg st="0" end="0"/>
-                                            </p:txEl>
-                                          </p:spTgt>
-                                        </p:tgtEl>
-                                        <p:attrNameLst>
-                                          <p:attrName>style.visibility</p:attrName>
-                                        </p:attrNameLst>
-                                      </p:cBhvr>
-                                      <p:to>
-                                        <p:strVal val="visible"/>
-                                      </p:to>
-                                    </p:set>
-                                    <p:animEffect transition="in" filter="wipe(down)">
-                                      <p:cBhvr>
-                                        <p:cTn id="22" dur="500"/>
-                                        <p:tgtEl>
-                                          <p:spTgt spid="3">
-                                            <p:txEl>
-                                              <p:pRg st="0" end="0"/>
-                                            </p:txEl>
-                                          </p:spTgt>
-                                        </p:tgtEl>
-                                      </p:cBhvr>
-                                    </p:animEffect>
-                                  </p:childTnLst>
-                                </p:cTn>
-                              </p:par>
-                            </p:childTnLst>
-                          </p:cTn>
-                        </p:par>
-                      </p:childTnLst>
-                    </p:cTn>
-                  </p:par>
-                </p:childTnLst>
-              </p:cTn>
-              <p:prevCondLst>
-                <p:cond evt="onPrev" delay="0">
-                  <p:tgtEl>
-                    <p:sldTgt/>
-                  </p:tgtEl>
-                </p:cond>
-              </p:prevCondLst>
-              <p:nextCondLst>
-                <p:cond evt="onNext" delay="0">
-                  <p:tgtEl>
-                    <p:sldTgt/>
-                  </p:tgtEl>
-                </p:cond>
-              </p:nextCondLst>
-            </p:seq>
-          </p:childTnLst>
-        </p:cTn>
-      </p:par>
-    </p:tnLst>
-  </p:timing>
-</p:sld>
-</file>
-
-<file path=ppt/slides/slide5.xml><?xml version="1.0" encoding="utf-8"?>
-<p:sld xmlns:a="http://schemas.openxmlformats.org/drawingml/2006/main" xmlns:r="http://schemas.openxmlformats.org/officeDocument/2006/relationships" xmlns:p="http://schemas.openxmlformats.org/presentationml/2006/main">
-  <p:cSld>
-    <p:spTree>
-      <p:nvGrpSpPr>
-        <p:cNvPr id="1" name=""/>
-        <p:cNvGrpSpPr/>
-        <p:nvPr/>
-      </p:nvGrpSpPr>
-      <p:grpSpPr>
-        <a:xfrm>
-          <a:off x="0" y="0"/>
-          <a:ext cx="0" cy="0"/>
-          <a:chOff x="0" y="0"/>
-          <a:chExt cx="0" cy="0"/>
-        </a:xfrm>
-      </p:grpSpPr>
-      <p:sp>
-        <p:nvSpPr>
-          <p:cNvPr id="3" name="מציין מיקום תוכן 2">
-            <a:extLst>
-              <a:ext uri="{FF2B5EF4-FFF2-40B4-BE49-F238E27FC236}">
-                <a16:creationId xmlns:a16="http://schemas.microsoft.com/office/drawing/2014/main" id="{F7C50087-7907-43FB-A82D-ABC9E2E7A824}"/>
-              </a:ext>
-            </a:extLst>
-          </p:cNvPr>
-          <p:cNvSpPr>
-            <a:spLocks noGrp="1"/>
-          </p:cNvSpPr>
-          <p:nvPr>
-            <p:ph idx="1"/>
-          </p:nvPr>
-        </p:nvSpPr>
-        <p:spPr/>
-        <p:txBody>
-          <a:bodyPr>
             <a:normAutofit/>
           </a:bodyPr>
           <a:lstStyle/>
@@ -4799,21 +4931,14 @@
             <a:pPr algn="l" rtl="0"/>
             <a:r>
               <a:rPr lang="en-US" dirty="0"/>
-              <a:t>Our data is stored in 2 tables (“models”) – one for people and one for tasks.</a:t>
+              <a:t>Our data is stored in 2 tables (“models”) – “people” and “tasks”.</a:t>
             </a:r>
           </a:p>
           <a:p>
             <a:pPr algn="l" rtl="0"/>
             <a:r>
               <a:rPr lang="en-US" dirty="0"/>
-              <a:t>The table “people” contains data about the people that are registered in the system.</a:t>
-            </a:r>
-          </a:p>
-          <a:p>
-            <a:pPr algn="l" rtl="0"/>
-            <a:r>
-              <a:rPr lang="en-US" dirty="0"/>
-              <a:t>The table “tasks” contains data about the tasks in the system – with a field “</a:t>
+              <a:t>The table “people” contains data about the task owners, while  “tasks” contains data about the tasks in the system – tables are related using  “</a:t>
             </a:r>
             <a:r>
               <a:rPr lang="en-US" b="1" dirty="0"/>
@@ -4821,14 +4946,22 @@
             </a:r>
             <a:r>
               <a:rPr lang="en-US" dirty="0"/>
-              <a:t>” that relates to the people table.</a:t>
+              <a:t>” field.</a:t>
             </a:r>
           </a:p>
           <a:p>
             <a:pPr algn="l" rtl="0"/>
             <a:r>
               <a:rPr lang="en-US" dirty="0"/>
-              <a:t>We chose this specific storage because it has great support in C#. It is fast, reliable and accessible.</a:t>
+              <a:t>We chose this specific storage because it has great support in C#. It is fast, reliable and accessible. In addition, it has integrated checking for values in the table (</a:t>
+            </a:r>
+            <a:r>
+              <a:rPr lang="en-US" dirty="0" err="1"/>
+              <a:t>i.e</a:t>
+            </a:r>
+            <a:r>
+              <a:rPr lang="en-US" dirty="0"/>
+              <a:t> – task status is checked directly in the DB</a:t>
             </a:r>
             <a:endParaRPr lang="he-IL" b="1" dirty="0">
               <a:solidFill>
@@ -5155,27 +5288,184 @@
                       </p:childTnLst>
                     </p:cTn>
                   </p:par>
+                </p:childTnLst>
+              </p:cTn>
+              <p:prevCondLst>
+                <p:cond evt="onPrev" delay="0">
+                  <p:tgtEl>
+                    <p:sldTgt/>
+                  </p:tgtEl>
+                </p:cond>
+              </p:prevCondLst>
+              <p:nextCondLst>
+                <p:cond evt="onNext" delay="0">
+                  <p:tgtEl>
+                    <p:sldTgt/>
+                  </p:tgtEl>
+                </p:cond>
+              </p:nextCondLst>
+            </p:seq>
+          </p:childTnLst>
+        </p:cTn>
+      </p:par>
+    </p:tnLst>
+  </p:timing>
+</p:sld>
+</file>
+
+<file path=ppt/slides/slide5.xml><?xml version="1.0" encoding="utf-8"?>
+<p:sld xmlns:a="http://schemas.openxmlformats.org/drawingml/2006/main" xmlns:r="http://schemas.openxmlformats.org/officeDocument/2006/relationships" xmlns:p="http://schemas.openxmlformats.org/presentationml/2006/main">
+  <p:cSld>
+    <p:spTree>
+      <p:nvGrpSpPr>
+        <p:cNvPr id="1" name=""/>
+        <p:cNvGrpSpPr/>
+        <p:nvPr/>
+      </p:nvGrpSpPr>
+      <p:grpSpPr>
+        <a:xfrm>
+          <a:off x="0" y="0"/>
+          <a:ext cx="0" cy="0"/>
+          <a:chOff x="0" y="0"/>
+          <a:chExt cx="0" cy="0"/>
+        </a:xfrm>
+      </p:grpSpPr>
+      <p:sp>
+        <p:nvSpPr>
+          <p:cNvPr id="3" name="מציין מיקום תוכן 2">
+            <a:extLst>
+              <a:ext uri="{FF2B5EF4-FFF2-40B4-BE49-F238E27FC236}">
+                <a16:creationId xmlns:a16="http://schemas.microsoft.com/office/drawing/2014/main" id="{F7C50087-7907-43FB-A82D-ABC9E2E7A824}"/>
+              </a:ext>
+            </a:extLst>
+          </p:cNvPr>
+          <p:cNvSpPr>
+            <a:spLocks noGrp="1"/>
+          </p:cNvSpPr>
+          <p:nvPr>
+            <p:ph idx="1"/>
+          </p:nvPr>
+        </p:nvSpPr>
+        <p:spPr>
+          <a:xfrm>
+            <a:off x="4060371" y="3429000"/>
+            <a:ext cx="6994483" cy="2037345"/>
+          </a:xfrm>
+        </p:spPr>
+        <p:txBody>
+          <a:bodyPr>
+            <a:normAutofit/>
+          </a:bodyPr>
+          <a:lstStyle/>
+          <a:p>
+            <a:pPr algn="l" rtl="0"/>
+            <a:endParaRPr lang="en-US" dirty="0"/>
+          </a:p>
+        </p:txBody>
+      </p:sp>
+      <p:pic>
+        <p:nvPicPr>
+          <p:cNvPr id="4" name="תמונה 1">
+            <a:extLst>
+              <a:ext uri="{FF2B5EF4-FFF2-40B4-BE49-F238E27FC236}">
+                <a16:creationId xmlns:a16="http://schemas.microsoft.com/office/drawing/2014/main" id="{E5F03786-C248-5164-94FD-EAAFF74626E3}"/>
+              </a:ext>
+            </a:extLst>
+          </p:cNvPr>
+          <p:cNvPicPr>
+            <a:picLocks noChangeAspect="1"/>
+          </p:cNvPicPr>
+          <p:nvPr/>
+        </p:nvPicPr>
+        <p:blipFill rotWithShape="1">
+          <a:blip r:embed="rId3"/>
+          <a:srcRect l="19991" t="2090" r="17143" b="8787"/>
+          <a:stretch/>
+        </p:blipFill>
+        <p:spPr>
+          <a:xfrm>
+            <a:off x="639445" y="351864"/>
+            <a:ext cx="2982686" cy="5397672"/>
+          </a:xfrm>
+          <a:prstGeom prst="rect">
+            <a:avLst/>
+          </a:prstGeom>
+        </p:spPr>
+      </p:pic>
+      <p:pic>
+        <p:nvPicPr>
+          <p:cNvPr id="6" name="Picture 5" descr="Diagram&#10;&#10;Description automatically generated">
+            <a:extLst>
+              <a:ext uri="{FF2B5EF4-FFF2-40B4-BE49-F238E27FC236}">
+                <a16:creationId xmlns:a16="http://schemas.microsoft.com/office/drawing/2014/main" id="{CD6D6488-2728-8396-72F4-1E9026765A8D}"/>
+              </a:ext>
+            </a:extLst>
+          </p:cNvPr>
+          <p:cNvPicPr>
+            <a:picLocks noChangeAspect="1"/>
+          </p:cNvPicPr>
+          <p:nvPr/>
+        </p:nvPicPr>
+        <p:blipFill>
+          <a:blip r:embed="rId4"/>
+          <a:stretch>
+            <a:fillRect/>
+          </a:stretch>
+        </p:blipFill>
+        <p:spPr>
+          <a:xfrm>
+            <a:off x="3622131" y="351864"/>
+            <a:ext cx="5731510" cy="2782570"/>
+          </a:xfrm>
+          <a:prstGeom prst="rect">
+            <a:avLst/>
+          </a:prstGeom>
+        </p:spPr>
+      </p:pic>
+    </p:spTree>
+    <p:extLst>
+      <p:ext uri="{BB962C8B-B14F-4D97-AF65-F5344CB8AC3E}">
+        <p14:creationId xmlns:p14="http://schemas.microsoft.com/office/powerpoint/2010/main" val="700676066"/>
+      </p:ext>
+    </p:extLst>
+  </p:cSld>
+  <p:clrMapOvr>
+    <a:masterClrMapping/>
+  </p:clrMapOvr>
+  <p:timing>
+    <p:tnLst>
+      <p:par>
+        <p:cTn id="1" dur="indefinite" restart="never" nodeType="tmRoot">
+          <p:childTnLst>
+            <p:seq concurrent="1" nextAc="seek">
+              <p:cTn id="2" dur="indefinite" nodeType="mainSeq">
+                <p:childTnLst>
                   <p:par>
-                    <p:cTn id="23" fill="hold">
+                    <p:cTn id="3" fill="hold">
                       <p:stCondLst>
                         <p:cond delay="indefinite"/>
                       </p:stCondLst>
                       <p:childTnLst>
                         <p:par>
-                          <p:cTn id="24" fill="hold">
+                          <p:cTn id="4" fill="hold">
                             <p:stCondLst>
                               <p:cond delay="0"/>
                             </p:stCondLst>
                             <p:childTnLst>
                               <p:par>
-                                <p:cTn id="25" presetID="10" presetClass="entr" presetSubtype="0" fill="hold" nodeType="clickEffect">
+                                <p:cTn id="5" presetID="22" presetClass="entr" presetSubtype="4" fill="hold" nodeType="clickEffect" nodePh="1">
                                   <p:stCondLst>
                                     <p:cond delay="0"/>
                                   </p:stCondLst>
+                                  <p:endCondLst>
+                                    <p:cond evt="begin" delay="0">
+                                      <p:tn val="5"/>
+                                    </p:cond>
+                                  </p:endCondLst>
                                   <p:childTnLst>
                                     <p:set>
                                       <p:cBhvr>
-                                        <p:cTn id="26" dur="1" fill="hold">
+                                        <p:cTn id="6" dur="1" fill="hold">
                                           <p:stCondLst>
                                             <p:cond delay="0"/>
                                           </p:stCondLst>
@@ -5183,7 +5473,7 @@
                                         <p:tgtEl>
                                           <p:spTgt spid="3">
                                             <p:txEl>
-                                              <p:pRg st="4" end="4"/>
+                                              <p:pRg st="0" end="0"/>
                                             </p:txEl>
                                           </p:spTgt>
                                         </p:tgtEl>
@@ -5195,13 +5485,13 @@
                                         <p:strVal val="visible"/>
                                       </p:to>
                                     </p:set>
-                                    <p:animEffect transition="in" filter="fade">
+                                    <p:animEffect transition="in" filter="wipe(down)">
                                       <p:cBhvr>
-                                        <p:cTn id="27" dur="500"/>
+                                        <p:cTn id="7" dur="500"/>
                                         <p:tgtEl>
                                           <p:spTgt spid="3">
                                             <p:txEl>
-                                              <p:pRg st="4" end="4"/>
+                                              <p:pRg st="0" end="0"/>
                                             </p:txEl>
                                           </p:spTgt>
                                         </p:tgtEl>
@@ -5492,4 +5782,299 @@
     </a:ext>
   </a:extLst>
 </a:theme>
+</file>
+
+<file path=ppt/theme/theme2.xml><?xml version="1.0" encoding="utf-8"?>
+<a:theme xmlns:a="http://schemas.openxmlformats.org/drawingml/2006/main" name="Office Theme">
+  <a:themeElements>
+    <a:clrScheme name="Office">
+      <a:dk1>
+        <a:sysClr val="windowText" lastClr="000000"/>
+      </a:dk1>
+      <a:lt1>
+        <a:sysClr val="window" lastClr="FFFFFF"/>
+      </a:lt1>
+      <a:dk2>
+        <a:srgbClr val="44546A"/>
+      </a:dk2>
+      <a:lt2>
+        <a:srgbClr val="E7E6E6"/>
+      </a:lt2>
+      <a:accent1>
+        <a:srgbClr val="4472C4"/>
+      </a:accent1>
+      <a:accent2>
+        <a:srgbClr val="ED7D31"/>
+      </a:accent2>
+      <a:accent3>
+        <a:srgbClr val="A5A5A5"/>
+      </a:accent3>
+      <a:accent4>
+        <a:srgbClr val="FFC000"/>
+      </a:accent4>
+      <a:accent5>
+        <a:srgbClr val="5B9BD5"/>
+      </a:accent5>
+      <a:accent6>
+        <a:srgbClr val="70AD47"/>
+      </a:accent6>
+      <a:hlink>
+        <a:srgbClr val="0563C1"/>
+      </a:hlink>
+      <a:folHlink>
+        <a:srgbClr val="954F72"/>
+      </a:folHlink>
+    </a:clrScheme>
+    <a:fontScheme name="Office">
+      <a:majorFont>
+        <a:latin typeface="Calibri Light" panose="020F0302020204030204"/>
+        <a:ea typeface=""/>
+        <a:cs typeface=""/>
+        <a:font script="Jpan" typeface="游ゴシック Light"/>
+        <a:font script="Hang" typeface="맑은 고딕"/>
+        <a:font script="Hans" typeface="等线 Light"/>
+        <a:font script="Hant" typeface="新細明體"/>
+        <a:font script="Arab" typeface="Times New Roman"/>
+        <a:font script="Hebr" typeface="Times New Roman"/>
+        <a:font script="Thai" typeface="Angsana New"/>
+        <a:font script="Ethi" typeface="Nyala"/>
+        <a:font script="Beng" typeface="Vrinda"/>
+        <a:font script="Gujr" typeface="Shruti"/>
+        <a:font script="Khmr" typeface="MoolBoran"/>
+        <a:font script="Knda" typeface="Tunga"/>
+        <a:font script="Guru" typeface="Raavi"/>
+        <a:font script="Cans" typeface="Euphemia"/>
+        <a:font script="Cher" typeface="Plantagenet Cherokee"/>
+        <a:font script="Yiii" typeface="Microsoft Yi Baiti"/>
+        <a:font script="Tibt" typeface="Microsoft Himalaya"/>
+        <a:font script="Thaa" typeface="MV Boli"/>
+        <a:font script="Deva" typeface="Mangal"/>
+        <a:font script="Telu" typeface="Gautami"/>
+        <a:font script="Taml" typeface="Latha"/>
+        <a:font script="Syrc" typeface="Estrangelo Edessa"/>
+        <a:font script="Orya" typeface="Kalinga"/>
+        <a:font script="Mlym" typeface="Kartika"/>
+        <a:font script="Laoo" typeface="DokChampa"/>
+        <a:font script="Sinh" typeface="Iskoola Pota"/>
+        <a:font script="Mong" typeface="Mongolian Baiti"/>
+        <a:font script="Viet" typeface="Times New Roman"/>
+        <a:font script="Uigh" typeface="Microsoft Uighur"/>
+        <a:font script="Geor" typeface="Sylfaen"/>
+        <a:font script="Armn" typeface="Arial"/>
+        <a:font script="Bugi" typeface="Leelawadee UI"/>
+        <a:font script="Bopo" typeface="Microsoft JhengHei"/>
+        <a:font script="Java" typeface="Javanese Text"/>
+        <a:font script="Lisu" typeface="Segoe UI"/>
+        <a:font script="Mymr" typeface="Myanmar Text"/>
+        <a:font script="Nkoo" typeface="Ebrima"/>
+        <a:font script="Olck" typeface="Nirmala UI"/>
+        <a:font script="Osma" typeface="Ebrima"/>
+        <a:font script="Phag" typeface="Phagspa"/>
+        <a:font script="Syrn" typeface="Estrangelo Edessa"/>
+        <a:font script="Syrj" typeface="Estrangelo Edessa"/>
+        <a:font script="Syre" typeface="Estrangelo Edessa"/>
+        <a:font script="Sora" typeface="Nirmala UI"/>
+        <a:font script="Tale" typeface="Microsoft Tai Le"/>
+        <a:font script="Talu" typeface="Microsoft New Tai Lue"/>
+        <a:font script="Tfng" typeface="Ebrima"/>
+      </a:majorFont>
+      <a:minorFont>
+        <a:latin typeface="Calibri" panose="020F0502020204030204"/>
+        <a:ea typeface=""/>
+        <a:cs typeface=""/>
+        <a:font script="Jpan" typeface="游ゴシック"/>
+        <a:font script="Hang" typeface="맑은 고딕"/>
+        <a:font script="Hans" typeface="等线"/>
+        <a:font script="Hant" typeface="新細明體"/>
+        <a:font script="Arab" typeface="Arial"/>
+        <a:font script="Hebr" typeface="Arial"/>
+        <a:font script="Thai" typeface="Cordia New"/>
+        <a:font script="Ethi" typeface="Nyala"/>
+        <a:font script="Beng" typeface="Vrinda"/>
+        <a:font script="Gujr" typeface="Shruti"/>
+        <a:font script="Khmr" typeface="DaunPenh"/>
+        <a:font script="Knda" typeface="Tunga"/>
+        <a:font script="Guru" typeface="Raavi"/>
+        <a:font script="Cans" typeface="Euphemia"/>
+        <a:font script="Cher" typeface="Plantagenet Cherokee"/>
+        <a:font script="Yiii" typeface="Microsoft Yi Baiti"/>
+        <a:font script="Tibt" typeface="Microsoft Himalaya"/>
+        <a:font script="Thaa" typeface="MV Boli"/>
+        <a:font script="Deva" typeface="Mangal"/>
+        <a:font script="Telu" typeface="Gautami"/>
+        <a:font script="Taml" typeface="Latha"/>
+        <a:font script="Syrc" typeface="Estrangelo Edessa"/>
+        <a:font script="Orya" typeface="Kalinga"/>
+        <a:font script="Mlym" typeface="Kartika"/>
+        <a:font script="Laoo" typeface="DokChampa"/>
+        <a:font script="Sinh" typeface="Iskoola Pota"/>
+        <a:font script="Mong" typeface="Mongolian Baiti"/>
+        <a:font script="Viet" typeface="Arial"/>
+        <a:font script="Uigh" typeface="Microsoft Uighur"/>
+        <a:font script="Geor" typeface="Sylfaen"/>
+        <a:font script="Armn" typeface="Arial"/>
+        <a:font script="Bugi" typeface="Leelawadee UI"/>
+        <a:font script="Bopo" typeface="Microsoft JhengHei"/>
+        <a:font script="Java" typeface="Javanese Text"/>
+        <a:font script="Lisu" typeface="Segoe UI"/>
+        <a:font script="Mymr" typeface="Myanmar Text"/>
+        <a:font script="Nkoo" typeface="Ebrima"/>
+        <a:font script="Olck" typeface="Nirmala UI"/>
+        <a:font script="Osma" typeface="Ebrima"/>
+        <a:font script="Phag" typeface="Phagspa"/>
+        <a:font script="Syrn" typeface="Estrangelo Edessa"/>
+        <a:font script="Syrj" typeface="Estrangelo Edessa"/>
+        <a:font script="Syre" typeface="Estrangelo Edessa"/>
+        <a:font script="Sora" typeface="Nirmala UI"/>
+        <a:font script="Tale" typeface="Microsoft Tai Le"/>
+        <a:font script="Talu" typeface="Microsoft New Tai Lue"/>
+        <a:font script="Tfng" typeface="Ebrima"/>
+      </a:minorFont>
+    </a:fontScheme>
+    <a:fmtScheme name="Office">
+      <a:fillStyleLst>
+        <a:solidFill>
+          <a:schemeClr val="phClr"/>
+        </a:solidFill>
+        <a:gradFill rotWithShape="1">
+          <a:gsLst>
+            <a:gs pos="0">
+              <a:schemeClr val="phClr">
+                <a:lumMod val="110000"/>
+                <a:satMod val="105000"/>
+                <a:tint val="67000"/>
+              </a:schemeClr>
+            </a:gs>
+            <a:gs pos="50000">
+              <a:schemeClr val="phClr">
+                <a:lumMod val="105000"/>
+                <a:satMod val="103000"/>
+                <a:tint val="73000"/>
+              </a:schemeClr>
+            </a:gs>
+            <a:gs pos="100000">
+              <a:schemeClr val="phClr">
+                <a:lumMod val="105000"/>
+                <a:satMod val="109000"/>
+                <a:tint val="81000"/>
+              </a:schemeClr>
+            </a:gs>
+          </a:gsLst>
+          <a:lin ang="5400000" scaled="0"/>
+        </a:gradFill>
+        <a:gradFill rotWithShape="1">
+          <a:gsLst>
+            <a:gs pos="0">
+              <a:schemeClr val="phClr">
+                <a:satMod val="103000"/>
+                <a:lumMod val="102000"/>
+                <a:tint val="94000"/>
+              </a:schemeClr>
+            </a:gs>
+            <a:gs pos="50000">
+              <a:schemeClr val="phClr">
+                <a:satMod val="110000"/>
+                <a:lumMod val="100000"/>
+                <a:shade val="100000"/>
+              </a:schemeClr>
+            </a:gs>
+            <a:gs pos="100000">
+              <a:schemeClr val="phClr">
+                <a:lumMod val="99000"/>
+                <a:satMod val="120000"/>
+                <a:shade val="78000"/>
+              </a:schemeClr>
+            </a:gs>
+          </a:gsLst>
+          <a:lin ang="5400000" scaled="0"/>
+        </a:gradFill>
+      </a:fillStyleLst>
+      <a:lnStyleLst>
+        <a:ln w="6350" cap="flat" cmpd="sng" algn="ctr">
+          <a:solidFill>
+            <a:schemeClr val="phClr"/>
+          </a:solidFill>
+          <a:prstDash val="solid"/>
+          <a:miter lim="800000"/>
+        </a:ln>
+        <a:ln w="12700" cap="flat" cmpd="sng" algn="ctr">
+          <a:solidFill>
+            <a:schemeClr val="phClr"/>
+          </a:solidFill>
+          <a:prstDash val="solid"/>
+          <a:miter lim="800000"/>
+        </a:ln>
+        <a:ln w="19050" cap="flat" cmpd="sng" algn="ctr">
+          <a:solidFill>
+            <a:schemeClr val="phClr"/>
+          </a:solidFill>
+          <a:prstDash val="solid"/>
+          <a:miter lim="800000"/>
+        </a:ln>
+      </a:lnStyleLst>
+      <a:effectStyleLst>
+        <a:effectStyle>
+          <a:effectLst/>
+        </a:effectStyle>
+        <a:effectStyle>
+          <a:effectLst/>
+        </a:effectStyle>
+        <a:effectStyle>
+          <a:effectLst>
+            <a:outerShdw blurRad="57150" dist="19050" dir="5400000" algn="ctr" rotWithShape="0">
+              <a:srgbClr val="000000">
+                <a:alpha val="63000"/>
+              </a:srgbClr>
+            </a:outerShdw>
+          </a:effectLst>
+        </a:effectStyle>
+      </a:effectStyleLst>
+      <a:bgFillStyleLst>
+        <a:solidFill>
+          <a:schemeClr val="phClr"/>
+        </a:solidFill>
+        <a:solidFill>
+          <a:schemeClr val="phClr">
+            <a:tint val="95000"/>
+            <a:satMod val="170000"/>
+          </a:schemeClr>
+        </a:solidFill>
+        <a:gradFill rotWithShape="1">
+          <a:gsLst>
+            <a:gs pos="0">
+              <a:schemeClr val="phClr">
+                <a:tint val="93000"/>
+                <a:satMod val="150000"/>
+                <a:shade val="98000"/>
+                <a:lumMod val="102000"/>
+              </a:schemeClr>
+            </a:gs>
+            <a:gs pos="50000">
+              <a:schemeClr val="phClr">
+                <a:tint val="98000"/>
+                <a:satMod val="130000"/>
+                <a:shade val="90000"/>
+                <a:lumMod val="103000"/>
+              </a:schemeClr>
+            </a:gs>
+            <a:gs pos="100000">
+              <a:schemeClr val="phClr">
+                <a:shade val="63000"/>
+                <a:satMod val="120000"/>
+              </a:schemeClr>
+            </a:gs>
+          </a:gsLst>
+          <a:lin ang="5400000" scaled="0"/>
+        </a:gradFill>
+      </a:bgFillStyleLst>
+    </a:fmtScheme>
+  </a:themeElements>
+  <a:objectDefaults/>
+  <a:extraClrSchemeLst/>
+  <a:extLst>
+    <a:ext uri="{05A4C25C-085E-4340-85A3-A5531E510DB2}">
+      <thm15:themeFamily xmlns:thm15="http://schemas.microsoft.com/office/thememl/2012/main" name="Office Theme" id="{62F939B6-93AF-4DB8-9C6B-D6C7DFDC589F}" vid="{4A3C46E8-61CC-4603-A589-7422A47A8E4A}"/>
+    </a:ext>
+  </a:extLst>
+</a:theme>
 </file>
</xml_diff>